<commit_message>
Finale(?) Version der Geschäftsidee
</commit_message>
<xml_diff>
--- a/Studium MW/Projektmanagement/Idee.pptx
+++ b/Studium MW/Projektmanagement/Idee.pptx
@@ -111,7 +111,7 @@
   </p:defaultTextStyle>
   <p:extLst>
     <p:ext uri="{EFAFB233-063F-42B5-8137-9DF3F51BA10A}">
-      <p15:sldGuideLst xmlns:p15="http://schemas.microsoft.com/office/powerpoint/2012/main" xmlns="">
+      <p15:sldGuideLst xmlns="" xmlns:p15="http://schemas.microsoft.com/office/powerpoint/2012/main">
         <p15:guide id="1" orient="horz" pos="2160">
           <p15:clr>
             <a:srgbClr val="A4A3A4"/>
@@ -262,7 +262,7 @@
           <a:p>
             <a:fld id="{711FCEC3-2D29-4418-8A7E-B6AD9CCC15C9}" type="datetimeFigureOut">
               <a:rPr lang="de-DE" smtClean="0"/>
-              <a:t>19.10.2017</a:t>
+              <a:t>20.10.2017</a:t>
             </a:fld>
             <a:endParaRPr lang="de-DE"/>
           </a:p>
@@ -575,7 +575,7 @@
           <a:p>
             <a:fld id="{711FCEC3-2D29-4418-8A7E-B6AD9CCC15C9}" type="datetimeFigureOut">
               <a:rPr lang="de-DE" smtClean="0"/>
-              <a:t>19.10.2017</a:t>
+              <a:t>20.10.2017</a:t>
             </a:fld>
             <a:endParaRPr lang="de-DE"/>
           </a:p>
@@ -760,7 +760,7 @@
           <a:p>
             <a:fld id="{711FCEC3-2D29-4418-8A7E-B6AD9CCC15C9}" type="datetimeFigureOut">
               <a:rPr lang="de-DE" smtClean="0"/>
-              <a:t>19.10.2017</a:t>
+              <a:t>20.10.2017</a:t>
             </a:fld>
             <a:endParaRPr lang="de-DE"/>
           </a:p>
@@ -935,7 +935,7 @@
           <a:p>
             <a:fld id="{711FCEC3-2D29-4418-8A7E-B6AD9CCC15C9}" type="datetimeFigureOut">
               <a:rPr lang="de-DE" smtClean="0"/>
-              <a:t>19.10.2017</a:t>
+              <a:t>20.10.2017</a:t>
             </a:fld>
             <a:endParaRPr lang="de-DE"/>
           </a:p>
@@ -1203,7 +1203,7 @@
           <a:p>
             <a:fld id="{711FCEC3-2D29-4418-8A7E-B6AD9CCC15C9}" type="datetimeFigureOut">
               <a:rPr lang="de-DE" smtClean="0"/>
-              <a:t>19.10.2017</a:t>
+              <a:t>20.10.2017</a:t>
             </a:fld>
             <a:endParaRPr lang="de-DE"/>
           </a:p>
@@ -1671,7 +1671,7 @@
           <a:p>
             <a:fld id="{711FCEC3-2D29-4418-8A7E-B6AD9CCC15C9}" type="datetimeFigureOut">
               <a:rPr lang="de-DE" smtClean="0"/>
-              <a:t>19.10.2017</a:t>
+              <a:t>20.10.2017</a:t>
             </a:fld>
             <a:endParaRPr lang="de-DE"/>
           </a:p>
@@ -2160,7 +2160,7 @@
           <a:p>
             <a:fld id="{711FCEC3-2D29-4418-8A7E-B6AD9CCC15C9}" type="datetimeFigureOut">
               <a:rPr lang="de-DE" smtClean="0"/>
-              <a:t>19.10.2017</a:t>
+              <a:t>20.10.2017</a:t>
             </a:fld>
             <a:endParaRPr lang="de-DE"/>
           </a:p>
@@ -2286,7 +2286,7 @@
           <a:p>
             <a:fld id="{711FCEC3-2D29-4418-8A7E-B6AD9CCC15C9}" type="datetimeFigureOut">
               <a:rPr lang="de-DE" smtClean="0"/>
-              <a:t>19.10.2017</a:t>
+              <a:t>20.10.2017</a:t>
             </a:fld>
             <a:endParaRPr lang="de-DE"/>
           </a:p>
@@ -2430,7 +2430,7 @@
           <a:p>
             <a:fld id="{711FCEC3-2D29-4418-8A7E-B6AD9CCC15C9}" type="datetimeFigureOut">
               <a:rPr lang="de-DE" smtClean="0"/>
-              <a:t>19.10.2017</a:t>
+              <a:t>20.10.2017</a:t>
             </a:fld>
             <a:endParaRPr lang="de-DE"/>
           </a:p>
@@ -2752,7 +2752,7 @@
           <a:p>
             <a:fld id="{711FCEC3-2D29-4418-8A7E-B6AD9CCC15C9}" type="datetimeFigureOut">
               <a:rPr lang="de-DE" smtClean="0"/>
-              <a:t>19.10.2017</a:t>
+              <a:t>20.10.2017</a:t>
             </a:fld>
             <a:endParaRPr lang="de-DE"/>
           </a:p>
@@ -2886,7 +2886,7 @@
           <a:p>
             <a:fld id="{711FCEC3-2D29-4418-8A7E-B6AD9CCC15C9}" type="datetimeFigureOut">
               <a:rPr lang="de-DE" smtClean="0"/>
-              <a:t>19.10.2017</a:t>
+              <a:t>20.10.2017</a:t>
             </a:fld>
             <a:endParaRPr lang="de-DE"/>
           </a:p>
@@ -3667,7 +3667,7 @@
           <a:p>
             <a:fld id="{711FCEC3-2D29-4418-8A7E-B6AD9CCC15C9}" type="datetimeFigureOut">
               <a:rPr lang="de-DE" smtClean="0"/>
-              <a:t>19.10.2017</a:t>
+              <a:t>20.10.2017</a:t>
             </a:fld>
             <a:endParaRPr lang="de-DE"/>
           </a:p>
@@ -4175,7 +4175,7 @@
         </p:nvSpPr>
         <p:spPr>
           <a:xfrm>
-            <a:off x="1432560" y="732680"/>
+            <a:off x="1432560" y="1236736"/>
             <a:ext cx="7406640" cy="1472184"/>
           </a:xfrm>
         </p:spPr>
@@ -4315,7 +4315,7 @@
         </p:blipFill>
         <p:spPr bwMode="auto">
           <a:xfrm>
-            <a:off x="850758" y="1651975"/>
+            <a:off x="1282806" y="1651975"/>
             <a:ext cx="1921042" cy="1921042"/>
           </a:xfrm>
           <a:prstGeom prst="rect">
@@ -4558,7 +4558,7 @@
         </p:blipFill>
         <p:spPr bwMode="auto">
           <a:xfrm>
-            <a:off x="599767" y="4446081"/>
+            <a:off x="1031815" y="4446081"/>
             <a:ext cx="2009775" cy="1847850"/>
           </a:xfrm>
           <a:prstGeom prst="rect">
@@ -4601,14 +4601,14 @@
       </p:pic>
       <p:sp>
         <p:nvSpPr>
-          <p:cNvPr id="17" name="Textfeld 16"/>
+          <p:cNvPr id="18" name="Textfeld 17"/>
           <p:cNvSpPr txBox="1"/>
           <p:nvPr/>
         </p:nvSpPr>
         <p:spPr>
           <a:xfrm>
-            <a:off x="5724128" y="3645024"/>
-            <a:ext cx="815736" cy="461665"/>
+            <a:off x="1410474" y="6135687"/>
+            <a:ext cx="1586012" cy="461665"/>
           </a:xfrm>
           <a:prstGeom prst="rect">
             <a:avLst/>
@@ -4623,36 +4623,6 @@
           <a:p>
             <a:r>
               <a:rPr lang="de-DE" sz="2400" dirty="0" smtClean="0"/>
-              <a:t>Excel</a:t>
-            </a:r>
-            <a:endParaRPr lang="de-DE" dirty="0"/>
-          </a:p>
-        </p:txBody>
-      </p:sp>
-      <p:sp>
-        <p:nvSpPr>
-          <p:cNvPr id="18" name="Textfeld 17"/>
-          <p:cNvSpPr txBox="1"/>
-          <p:nvPr/>
-        </p:nvSpPr>
-        <p:spPr>
-          <a:xfrm>
-            <a:off x="978426" y="6135687"/>
-            <a:ext cx="1586012" cy="461665"/>
-          </a:xfrm>
-          <a:prstGeom prst="rect">
-            <a:avLst/>
-          </a:prstGeom>
-          <a:noFill/>
-        </p:spPr>
-        <p:txBody>
-          <a:bodyPr wrap="none" rtlCol="0">
-            <a:spAutoFit/>
-          </a:bodyPr>
-          <a:lstStyle/>
-          <a:p>
-            <a:r>
-              <a:rPr lang="de-DE" sz="2400" dirty="0" smtClean="0"/>
               <a:t>Gedächtnis</a:t>
             </a:r>
             <a:endParaRPr lang="de-DE" dirty="0"/>
@@ -4667,7 +4637,7 @@
         </p:nvSpPr>
         <p:spPr>
           <a:xfrm>
-            <a:off x="1113780" y="3645024"/>
+            <a:off x="1545828" y="3645024"/>
             <a:ext cx="1566070" cy="461665"/>
           </a:xfrm>
           <a:prstGeom prst="rect">
@@ -4728,15 +4698,13 @@
       <p:cxnSp>
         <p:nvCxnSpPr>
           <p:cNvPr id="20" name="Gerade Verbindung mit Pfeil 19"/>
-          <p:cNvCxnSpPr>
-            <a:stCxn id="1030" idx="0"/>
-          </p:cNvCxnSpPr>
+          <p:cNvCxnSpPr/>
           <p:nvPr/>
         </p:nvCxnSpPr>
         <p:spPr>
           <a:xfrm flipV="1">
-            <a:off x="4824028" y="3573017"/>
-            <a:ext cx="756084" cy="504509"/>
+            <a:off x="5004048" y="3573018"/>
+            <a:ext cx="576064" cy="533671"/>
           </a:xfrm>
           <a:prstGeom prst="straightConnector1">
             <a:avLst/>
@@ -4970,60 +4938,15 @@
                                   </p:childTnLst>
                                 </p:cTn>
                               </p:par>
-                            </p:childTnLst>
-                          </p:cTn>
-                        </p:par>
-                      </p:childTnLst>
-                    </p:cTn>
-                  </p:par>
-                  <p:par>
-                    <p:cTn id="19" fill="hold">
-                      <p:stCondLst>
-                        <p:cond delay="indefinite"/>
-                      </p:stCondLst>
-                      <p:childTnLst>
-                        <p:par>
-                          <p:cTn id="20" fill="hold">
-                            <p:stCondLst>
-                              <p:cond delay="0"/>
-                            </p:stCondLst>
-                            <p:childTnLst>
                               <p:par>
-                                <p:cTn id="21" presetID="1" presetClass="entr" presetSubtype="0" fill="hold" grpId="0" nodeType="clickEffect">
+                                <p:cTn id="19" presetID="1" presetClass="entr" presetSubtype="0" fill="hold" nodeType="withEffect">
                                   <p:stCondLst>
                                     <p:cond delay="0"/>
                                   </p:stCondLst>
                                   <p:childTnLst>
                                     <p:set>
                                       <p:cBhvr>
-                                        <p:cTn id="22" dur="1" fill="hold">
-                                          <p:stCondLst>
-                                            <p:cond delay="0"/>
-                                          </p:stCondLst>
-                                        </p:cTn>
-                                        <p:tgtEl>
-                                          <p:spTgt spid="17"/>
-                                        </p:tgtEl>
-                                        <p:attrNameLst>
-                                          <p:attrName>style.visibility</p:attrName>
-                                        </p:attrNameLst>
-                                      </p:cBhvr>
-                                      <p:to>
-                                        <p:strVal val="visible"/>
-                                      </p:to>
-                                    </p:set>
-                                  </p:childTnLst>
-                                </p:cTn>
-                              </p:par>
-                              <p:par>
-                                <p:cTn id="23" presetID="1" presetClass="entr" presetSubtype="0" fill="hold" nodeType="withEffect">
-                                  <p:stCondLst>
-                                    <p:cond delay="0"/>
-                                  </p:stCondLst>
-                                  <p:childTnLst>
-                                    <p:set>
-                                      <p:cBhvr>
-                                        <p:cTn id="24" dur="1" fill="hold">
+                                        <p:cTn id="20" dur="1" fill="hold">
                                           <p:stCondLst>
                                             <p:cond delay="0"/>
                                           </p:stCondLst>
@@ -5072,7 +4995,6 @@
     <p:bldLst>
       <p:bldP spid="10" grpId="0"/>
       <p:bldP spid="15" grpId="0"/>
-      <p:bldP spid="17" grpId="0"/>
       <p:bldP spid="19" grpId="0"/>
     </p:bldLst>
   </p:timing>
@@ -5119,7 +5041,7 @@
         </p:blipFill>
         <p:spPr bwMode="auto">
           <a:xfrm>
-            <a:off x="0" y="3686053"/>
+            <a:off x="1073268" y="3663093"/>
             <a:ext cx="1257933" cy="1156583"/>
           </a:xfrm>
           <a:prstGeom prst="rect">
@@ -5168,8 +5090,8 @@
         </p:nvCxnSpPr>
         <p:spPr>
           <a:xfrm>
-            <a:off x="1088159" y="4950397"/>
-            <a:ext cx="481016" cy="535605"/>
+            <a:off x="1962100" y="5095059"/>
+            <a:ext cx="302555" cy="267803"/>
           </a:xfrm>
           <a:prstGeom prst="straightConnector1">
             <a:avLst/>
@@ -5248,7 +5170,7 @@
         </p:blipFill>
         <p:spPr bwMode="auto">
           <a:xfrm>
-            <a:off x="0" y="5486400"/>
+            <a:off x="1643030" y="5486002"/>
             <a:ext cx="1281113" cy="960438"/>
           </a:xfrm>
           <a:prstGeom prst="rect">
@@ -5420,8 +5342,8 @@
         </p:nvSpPr>
         <p:spPr>
           <a:xfrm rot="2289147">
-            <a:off x="5979489" y="4111961"/>
-            <a:ext cx="699715" cy="369332"/>
+            <a:off x="5960325" y="4167379"/>
+            <a:ext cx="879132" cy="369332"/>
           </a:xfrm>
           <a:prstGeom prst="rect">
             <a:avLst/>
@@ -5483,8 +5405,8 @@
         </p:nvSpPr>
         <p:spPr>
           <a:xfrm>
-            <a:off x="141809" y="4786810"/>
-            <a:ext cx="864096" cy="369332"/>
+            <a:off x="1220677" y="4725728"/>
+            <a:ext cx="1078868" cy="369332"/>
           </a:xfrm>
           <a:prstGeom prst="rect">
             <a:avLst/>
@@ -5648,8 +5570,8 @@
         </p:nvSpPr>
         <p:spPr>
           <a:xfrm>
-            <a:off x="3599762" y="3735227"/>
-            <a:ext cx="1760783" cy="400110"/>
+            <a:off x="3419872" y="3735227"/>
+            <a:ext cx="1908342" cy="400110"/>
           </a:xfrm>
           <a:prstGeom prst="rect">
             <a:avLst/>
@@ -5846,8 +5768,8 @@
           <p:nvPr/>
         </p:nvSpPr>
         <p:spPr>
-          <a:xfrm rot="19886384">
-            <a:off x="6196733" y="1313544"/>
+          <a:xfrm rot="19725397">
+            <a:off x="6163586" y="1402903"/>
             <a:ext cx="826297" cy="307777"/>
           </a:xfrm>
           <a:prstGeom prst="rect">
@@ -5877,8 +5799,8 @@
         </p:nvSpPr>
         <p:spPr>
           <a:xfrm rot="718149">
-            <a:off x="5628513" y="3547526"/>
-            <a:ext cx="2412348" cy="307777"/>
+            <a:off x="5207773" y="3503419"/>
+            <a:ext cx="2837712" cy="307777"/>
           </a:xfrm>
           <a:prstGeom prst="rect">
             <a:avLst/>
@@ -5962,7 +5884,7 @@
         </p:blipFill>
         <p:spPr bwMode="auto">
           <a:xfrm>
-            <a:off x="1962100" y="216051"/>
+            <a:off x="2555776" y="116632"/>
             <a:ext cx="657110" cy="657110"/>
           </a:xfrm>
           <a:prstGeom prst="rect">
@@ -5988,8 +5910,8 @@
         </p:nvCxnSpPr>
         <p:spPr>
           <a:xfrm flipH="1">
-            <a:off x="1220677" y="875517"/>
-            <a:ext cx="2420707" cy="2810536"/>
+            <a:off x="1962100" y="875517"/>
+            <a:ext cx="1679285" cy="2697499"/>
           </a:xfrm>
           <a:prstGeom prst="straightConnector1">
             <a:avLst/>
@@ -6039,7 +5961,7 @@
         </p:blipFill>
         <p:spPr bwMode="auto">
           <a:xfrm>
-            <a:off x="141809" y="127664"/>
+            <a:off x="1465410" y="127664"/>
             <a:ext cx="946350" cy="946350"/>
           </a:xfrm>
           <a:prstGeom prst="rect">
@@ -6060,13 +5982,15 @@
       <p:cxnSp>
         <p:nvCxnSpPr>
           <p:cNvPr id="100" name="Gerade Verbindung mit Pfeil 99"/>
-          <p:cNvCxnSpPr/>
+          <p:cNvCxnSpPr>
+            <a:endCxn id="99" idx="3"/>
+          </p:cNvCxnSpPr>
           <p:nvPr/>
         </p:nvCxnSpPr>
         <p:spPr>
           <a:xfrm flipH="1">
-            <a:off x="1113994" y="485204"/>
-            <a:ext cx="2405645" cy="125943"/>
+            <a:off x="2411760" y="485204"/>
+            <a:ext cx="1107880" cy="115635"/>
           </a:xfrm>
           <a:prstGeom prst="straightConnector1">
             <a:avLst/>
@@ -6221,7 +6145,7 @@
         </p:blipFill>
         <p:spPr bwMode="auto">
           <a:xfrm>
-            <a:off x="2046527" y="2101690"/>
+            <a:off x="2671810" y="1750576"/>
             <a:ext cx="660420" cy="660420"/>
           </a:xfrm>
           <a:prstGeom prst="rect">
@@ -6247,8 +6171,8 @@
         </p:nvCxnSpPr>
         <p:spPr>
           <a:xfrm flipH="1">
-            <a:off x="1129677" y="685524"/>
-            <a:ext cx="2405099" cy="1639428"/>
+            <a:off x="2174831" y="685524"/>
+            <a:ext cx="1359946" cy="1231308"/>
           </a:xfrm>
           <a:prstGeom prst="straightConnector1">
             <a:avLst/>
@@ -6298,7 +6222,7 @@
         </p:blipFill>
         <p:spPr bwMode="auto">
           <a:xfrm>
-            <a:off x="1983974" y="1167819"/>
+            <a:off x="2573493" y="957566"/>
             <a:ext cx="599226" cy="599226"/>
           </a:xfrm>
           <a:prstGeom prst="rect">
@@ -6339,7 +6263,7 @@
         </p:blipFill>
         <p:spPr bwMode="auto">
           <a:xfrm>
-            <a:off x="90706" y="2080786"/>
+            <a:off x="1259632" y="1700808"/>
             <a:ext cx="915199" cy="915199"/>
           </a:xfrm>
           <a:prstGeom prst="rect">
@@ -6364,9 +6288,9 @@
           <p:nvPr/>
         </p:nvCxnSpPr>
         <p:spPr>
-          <a:xfrm>
-            <a:off x="604241" y="1118919"/>
-            <a:ext cx="10743" cy="888279"/>
+          <a:xfrm flipH="1">
+            <a:off x="1835696" y="1118919"/>
+            <a:ext cx="92146" cy="631657"/>
           </a:xfrm>
           <a:prstGeom prst="straightConnector1">
             <a:avLst/>
@@ -6396,13 +6320,15 @@
       <p:cxnSp>
         <p:nvCxnSpPr>
           <p:cNvPr id="133" name="Gerade Verbindung mit Pfeil 132"/>
-          <p:cNvCxnSpPr/>
+          <p:cNvCxnSpPr>
+            <a:stCxn id="1044" idx="0"/>
+          </p:cNvCxnSpPr>
           <p:nvPr/>
         </p:nvCxnSpPr>
         <p:spPr>
-          <a:xfrm flipH="1" flipV="1">
-            <a:off x="468593" y="1110102"/>
-            <a:ext cx="13270" cy="862923"/>
+          <a:xfrm flipV="1">
+            <a:off x="1717232" y="1110103"/>
+            <a:ext cx="74962" cy="590705"/>
           </a:xfrm>
           <a:prstGeom prst="straightConnector1">
             <a:avLst/>
@@ -6765,40 +6691,6 @@
           </a:p>
         </p:txBody>
       </p:sp>
-      <p:sp>
-        <p:nvSpPr>
-          <p:cNvPr id="4" name="Textfeld 3"/>
-          <p:cNvSpPr txBox="1"/>
-          <p:nvPr/>
-        </p:nvSpPr>
-        <p:spPr>
-          <a:xfrm>
-            <a:off x="457200" y="5085184"/>
-            <a:ext cx="4978896" cy="584775"/>
-          </a:xfrm>
-          <a:prstGeom prst="rect">
-            <a:avLst/>
-          </a:prstGeom>
-          <a:noFill/>
-        </p:spPr>
-        <p:txBody>
-          <a:bodyPr wrap="square" rtlCol="0">
-            <a:spAutoFit/>
-          </a:bodyPr>
-          <a:lstStyle/>
-          <a:p>
-            <a:pPr marL="457200" indent="-457200">
-              <a:buFont typeface="Arial" panose="020B0604020202020204" pitchFamily="34" charset="0"/>
-              <a:buChar char="•"/>
-            </a:pPr>
-            <a:r>
-              <a:rPr lang="de-DE" sz="3200" dirty="0" smtClean="0"/>
-              <a:t>Einfach erreichbar</a:t>
-            </a:r>
-            <a:endParaRPr lang="de-DE" sz="3200" dirty="0"/>
-          </a:p>
-        </p:txBody>
-      </p:sp>
     </p:spTree>
     <p:extLst>
       <p:ext uri="{BB962C8B-B14F-4D97-AF65-F5344CB8AC3E}">
@@ -6848,28 +6740,28 @@
         </p:nvSpPr>
         <p:spPr>
           <a:xfrm>
-            <a:off x="467544" y="2564904"/>
+            <a:off x="1670992" y="2646040"/>
             <a:ext cx="8229600" cy="1143000"/>
           </a:xfrm>
         </p:spPr>
         <p:txBody>
           <a:bodyPr>
-            <a:normAutofit fontScale="90000"/>
+            <a:noAutofit/>
           </a:bodyPr>
           <a:lstStyle/>
           <a:p>
             <a:r>
-              <a:rPr lang="de-DE" b="1" dirty="0" smtClean="0"/>
+              <a:rPr lang="de-DE" sz="4800" b="1" dirty="0" smtClean="0"/>
               <a:t>Vielen Dank für ihre </a:t>
             </a:r>
             <a:br>
-              <a:rPr lang="de-DE" b="1" dirty="0" smtClean="0"/>
+              <a:rPr lang="de-DE" sz="4800" b="1" dirty="0" smtClean="0"/>
             </a:br>
             <a:r>
-              <a:rPr lang="de-DE" b="1" dirty="0" smtClean="0"/>
+              <a:rPr lang="de-DE" sz="4800" b="1" dirty="0" smtClean="0"/>
               <a:t>Aufmerksamkeit!</a:t>
             </a:r>
-            <a:endParaRPr lang="de-DE" b="1" dirty="0"/>
+            <a:endParaRPr lang="de-DE" sz="4800" b="1" dirty="0"/>
           </a:p>
         </p:txBody>
       </p:sp>

</xml_diff>

<commit_message>
Finale(!) Version der Geschäftsidee
</commit_message>
<xml_diff>
--- a/Studium MW/Projektmanagement/Idee.pptx
+++ b/Studium MW/Projektmanagement/Idee.pptx
@@ -4965,6 +4965,60 @@
                                   </p:childTnLst>
                                 </p:cTn>
                               </p:par>
+                              <p:par>
+                                <p:cTn id="21" presetID="1" presetClass="entr" presetSubtype="0" fill="hold" nodeType="withEffect">
+                                  <p:stCondLst>
+                                    <p:cond delay="0"/>
+                                  </p:stCondLst>
+                                  <p:childTnLst>
+                                    <p:set>
+                                      <p:cBhvr>
+                                        <p:cTn id="22" dur="1" fill="hold">
+                                          <p:stCondLst>
+                                            <p:cond delay="0"/>
+                                          </p:stCondLst>
+                                        </p:cTn>
+                                        <p:tgtEl>
+                                          <p:spTgt spid="20"/>
+                                        </p:tgtEl>
+                                        <p:attrNameLst>
+                                          <p:attrName>style.visibility</p:attrName>
+                                        </p:attrNameLst>
+                                      </p:cBhvr>
+                                      <p:to>
+                                        <p:strVal val="visible"/>
+                                      </p:to>
+                                    </p:set>
+                                  </p:childTnLst>
+                                </p:cTn>
+                              </p:par>
+                              <p:par>
+                                <p:cTn id="23" presetID="1" presetClass="entr" presetSubtype="0" fill="hold" nodeType="withEffect">
+                                  <p:stCondLst>
+                                    <p:cond delay="0"/>
+                                  </p:stCondLst>
+                                  <p:childTnLst>
+                                    <p:set>
+                                      <p:cBhvr>
+                                        <p:cTn id="24" dur="1" fill="hold">
+                                          <p:stCondLst>
+                                            <p:cond delay="0"/>
+                                          </p:stCondLst>
+                                        </p:cTn>
+                                        <p:tgtEl>
+                                          <p:spTgt spid="16"/>
+                                        </p:tgtEl>
+                                        <p:attrNameLst>
+                                          <p:attrName>style.visibility</p:attrName>
+                                        </p:attrNameLst>
+                                      </p:cBhvr>
+                                      <p:to>
+                                        <p:strVal val="visible"/>
+                                      </p:to>
+                                    </p:set>
+                                  </p:childTnLst>
+                                </p:cTn>
+                              </p:par>
                             </p:childTnLst>
                           </p:cTn>
                         </p:par>
@@ -5209,7 +5263,7 @@
         </p:blipFill>
         <p:spPr bwMode="auto">
           <a:xfrm>
-            <a:off x="3633413" y="2583208"/>
+            <a:off x="3633413" y="3245023"/>
             <a:ext cx="1381946" cy="1238868"/>
           </a:xfrm>
           <a:prstGeom prst="rect">
@@ -5235,8 +5289,8 @@
         </p:nvCxnSpPr>
         <p:spPr>
           <a:xfrm flipV="1">
-            <a:off x="2640841" y="4133411"/>
-            <a:ext cx="878798" cy="1163416"/>
+            <a:off x="2640841" y="4463420"/>
+            <a:ext cx="852310" cy="833407"/>
           </a:xfrm>
           <a:prstGeom prst="straightConnector1">
             <a:avLst/>
@@ -5309,8 +5363,8 @@
         </p:nvCxnSpPr>
         <p:spPr>
           <a:xfrm>
-            <a:off x="5326601" y="3769648"/>
-            <a:ext cx="1693671" cy="1387544"/>
+            <a:off x="5206705" y="4149080"/>
+            <a:ext cx="1813567" cy="1008112"/>
           </a:xfrm>
           <a:prstGeom prst="straightConnector1">
             <a:avLst/>
@@ -5570,7 +5624,7 @@
         </p:nvSpPr>
         <p:spPr>
           <a:xfrm>
-            <a:off x="3419872" y="3735227"/>
+            <a:off x="3419872" y="4397042"/>
             <a:ext cx="1908342" cy="400110"/>
           </a:xfrm>
           <a:prstGeom prst="rect">
@@ -5599,9 +5653,9 @@
           <p:nvPr/>
         </p:nvCxnSpPr>
         <p:spPr>
-          <a:xfrm flipH="1" flipV="1">
-            <a:off x="5137595" y="3202642"/>
-            <a:ext cx="2674766" cy="532586"/>
+          <a:xfrm flipH="1">
+            <a:off x="5155388" y="3735228"/>
+            <a:ext cx="2656973" cy="0"/>
           </a:xfrm>
           <a:prstGeom prst="straightConnector1">
             <a:avLst/>
@@ -5736,8 +5790,8 @@
         </p:nvCxnSpPr>
         <p:spPr>
           <a:xfrm flipH="1">
-            <a:off x="5155388" y="1026656"/>
-            <a:ext cx="2582561" cy="1686716"/>
+            <a:off x="5137595" y="1026656"/>
+            <a:ext cx="2600355" cy="2218367"/>
           </a:xfrm>
           <a:prstGeom prst="straightConnector1">
             <a:avLst/>
@@ -5768,8 +5822,8 @@
           <p:nvPr/>
         </p:nvSpPr>
         <p:spPr>
-          <a:xfrm rot="19725397">
-            <a:off x="6163586" y="1402903"/>
+          <a:xfrm rot="19119513">
+            <a:off x="6160550" y="1640007"/>
             <a:ext cx="826297" cy="307777"/>
           </a:xfrm>
           <a:prstGeom prst="rect">
@@ -5798,8 +5852,8 @@
           <p:nvPr/>
         </p:nvSpPr>
         <p:spPr>
-          <a:xfrm rot="718149">
-            <a:off x="5207773" y="3503419"/>
+          <a:xfrm>
+            <a:off x="5334688" y="3717032"/>
             <a:ext cx="2837712" cy="307777"/>
           </a:xfrm>
           <a:prstGeom prst="rect">
@@ -5829,8 +5883,8 @@
         </p:nvSpPr>
         <p:spPr>
           <a:xfrm rot="16200000">
-            <a:off x="3980713" y="1593693"/>
-            <a:ext cx="703610" cy="827011"/>
+            <a:off x="3744521" y="2019315"/>
+            <a:ext cx="1175995" cy="827011"/>
           </a:xfrm>
           <a:prstGeom prst="rightArrow">
             <a:avLst/>
@@ -6097,8 +6151,8 @@
         </p:nvCxnSpPr>
         <p:spPr>
           <a:xfrm flipH="1">
-            <a:off x="5137595" y="2671868"/>
-            <a:ext cx="2544226" cy="286277"/>
+            <a:off x="5155388" y="2671868"/>
+            <a:ext cx="2526433" cy="778682"/>
           </a:xfrm>
           <a:prstGeom prst="straightConnector1">
             <a:avLst/>
@@ -6377,9 +6431,6 @@
                     <p:cTn id="3" fill="hold">
                       <p:stCondLst>
                         <p:cond delay="indefinite"/>
-                        <p:cond evt="onBegin" delay="0">
-                          <p:tn val="2"/>
-                        </p:cond>
                       </p:stCondLst>
                       <p:childTnLst>
                         <p:par>
@@ -6389,7 +6440,7 @@
                             </p:stCondLst>
                             <p:childTnLst>
                               <p:par>
-                                <p:cTn id="5" presetID="1" presetClass="entr" presetSubtype="0" fill="hold" nodeType="withEffect">
+                                <p:cTn id="5" presetID="1" presetClass="entr" presetSubtype="0" fill="hold" nodeType="clickEffect">
                                   <p:stCondLst>
                                     <p:cond delay="0"/>
                                   </p:stCondLst>
@@ -6397,33 +6448,6 @@
                                     <p:set>
                                       <p:cBhvr>
                                         <p:cTn id="6" dur="1" fill="hold">
-                                          <p:stCondLst>
-                                            <p:cond delay="0"/>
-                                          </p:stCondLst>
-                                        </p:cTn>
-                                        <p:tgtEl>
-                                          <p:spTgt spid="20"/>
-                                        </p:tgtEl>
-                                        <p:attrNameLst>
-                                          <p:attrName>style.visibility</p:attrName>
-                                        </p:attrNameLst>
-                                      </p:cBhvr>
-                                      <p:to>
-                                        <p:strVal val="visible"/>
-                                      </p:to>
-                                    </p:set>
-                                  </p:childTnLst>
-                                </p:cTn>
-                              </p:par>
-                              <p:par>
-                                <p:cTn id="7" presetID="1" presetClass="entr" presetSubtype="0" fill="hold" nodeType="withEffect">
-                                  <p:stCondLst>
-                                    <p:cond delay="0"/>
-                                  </p:stCondLst>
-                                  <p:childTnLst>
-                                    <p:set>
-                                      <p:cBhvr>
-                                        <p:cTn id="8" dur="1" fill="hold">
                                           <p:stCondLst>
                                             <p:cond delay="0"/>
                                           </p:stCondLst>
@@ -6443,7 +6467,34 @@
                                 </p:cTn>
                               </p:par>
                               <p:par>
-                                <p:cTn id="9" presetID="1" presetClass="entr" presetSubtype="0" fill="hold" grpId="0" nodeType="withEffect">
+                                <p:cTn id="7" presetID="1" presetClass="entr" presetSubtype="0" fill="hold" grpId="0" nodeType="withEffect">
+                                  <p:stCondLst>
+                                    <p:cond delay="0"/>
+                                  </p:stCondLst>
+                                  <p:childTnLst>
+                                    <p:set>
+                                      <p:cBhvr>
+                                        <p:cTn id="8" dur="1" fill="hold">
+                                          <p:stCondLst>
+                                            <p:cond delay="0"/>
+                                          </p:stCondLst>
+                                        </p:cTn>
+                                        <p:tgtEl>
+                                          <p:spTgt spid="71"/>
+                                        </p:tgtEl>
+                                        <p:attrNameLst>
+                                          <p:attrName>style.visibility</p:attrName>
+                                        </p:attrNameLst>
+                                      </p:cBhvr>
+                                      <p:to>
+                                        <p:strVal val="visible"/>
+                                      </p:to>
+                                    </p:set>
+                                  </p:childTnLst>
+                                </p:cTn>
+                              </p:par>
+                              <p:par>
+                                <p:cTn id="9" presetID="1" presetClass="entr" presetSubtype="0" fill="hold" nodeType="withEffect">
                                   <p:stCondLst>
                                     <p:cond delay="0"/>
                                   </p:stCondLst>
@@ -6456,7 +6507,7 @@
                                           </p:stCondLst>
                                         </p:cTn>
                                         <p:tgtEl>
-                                          <p:spTgt spid="58"/>
+                                          <p:spTgt spid="59"/>
                                         </p:tgtEl>
                                         <p:attrNameLst>
                                           <p:attrName>style.visibility</p:attrName>
@@ -6514,26 +6565,35 @@
                                   </p:childTnLst>
                                 </p:cTn>
                               </p:par>
-                            </p:childTnLst>
-                          </p:cTn>
-                        </p:par>
-                      </p:childTnLst>
-                    </p:cTn>
-                  </p:par>
-                  <p:par>
-                    <p:cTn id="15" fill="hold">
-                      <p:stCondLst>
-                        <p:cond delay="indefinite"/>
-                      </p:stCondLst>
-                      <p:childTnLst>
-                        <p:par>
-                          <p:cTn id="16" fill="hold">
-                            <p:stCondLst>
-                              <p:cond delay="0"/>
-                            </p:stCondLst>
-                            <p:childTnLst>
                               <p:par>
-                                <p:cTn id="17" presetID="1" presetClass="entr" presetSubtype="0" fill="hold" nodeType="clickEffect">
+                                <p:cTn id="15" presetID="1" presetClass="entr" presetSubtype="0" fill="hold" nodeType="withEffect">
+                                  <p:stCondLst>
+                                    <p:cond delay="0"/>
+                                  </p:stCondLst>
+                                  <p:childTnLst>
+                                    <p:set>
+                                      <p:cBhvr>
+                                        <p:cTn id="16" dur="1" fill="hold">
+                                          <p:stCondLst>
+                                            <p:cond delay="0"/>
+                                          </p:stCondLst>
+                                        </p:cTn>
+                                        <p:tgtEl>
+                                          <p:spTgt spid="1038"/>
+                                        </p:tgtEl>
+                                        <p:attrNameLst>
+                                          <p:attrName>style.visibility</p:attrName>
+                                        </p:attrNameLst>
+                                      </p:cBhvr>
+                                      <p:to>
+                                        <p:strVal val="visible"/>
+                                      </p:to>
+                                    </p:set>
+                                  </p:childTnLst>
+                                </p:cTn>
+                              </p:par>
+                              <p:par>
+                                <p:cTn id="17" presetID="1" presetClass="entr" presetSubtype="0" fill="hold" nodeType="withEffect">
                                   <p:stCondLst>
                                     <p:cond delay="0"/>
                                   </p:stCondLst>
@@ -6546,7 +6606,259 @@
                                           </p:stCondLst>
                                         </p:cTn>
                                         <p:tgtEl>
+                                          <p:spTgt spid="112"/>
+                                        </p:tgtEl>
+                                        <p:attrNameLst>
+                                          <p:attrName>style.visibility</p:attrName>
+                                        </p:attrNameLst>
+                                      </p:cBhvr>
+                                      <p:to>
+                                        <p:strVal val="visible"/>
+                                      </p:to>
+                                    </p:set>
+                                  </p:childTnLst>
+                                </p:cTn>
+                              </p:par>
+                              <p:par>
+                                <p:cTn id="19" presetID="1" presetClass="entr" presetSubtype="0" fill="hold" nodeType="withEffect">
+                                  <p:stCondLst>
+                                    <p:cond delay="0"/>
+                                  </p:stCondLst>
+                                  <p:childTnLst>
+                                    <p:set>
+                                      <p:cBhvr>
+                                        <p:cTn id="20" dur="1" fill="hold">
+                                          <p:stCondLst>
+                                            <p:cond delay="0"/>
+                                          </p:stCondLst>
+                                        </p:cTn>
+                                        <p:tgtEl>
+                                          <p:spTgt spid="104"/>
+                                        </p:tgtEl>
+                                        <p:attrNameLst>
+                                          <p:attrName>style.visibility</p:attrName>
+                                        </p:attrNameLst>
+                                      </p:cBhvr>
+                                      <p:to>
+                                        <p:strVal val="visible"/>
+                                      </p:to>
+                                    </p:set>
+                                  </p:childTnLst>
+                                </p:cTn>
+                              </p:par>
+                            </p:childTnLst>
+                          </p:cTn>
+                        </p:par>
+                      </p:childTnLst>
+                    </p:cTn>
+                  </p:par>
+                  <p:par>
+                    <p:cTn id="21" fill="hold">
+                      <p:stCondLst>
+                        <p:cond delay="indefinite"/>
+                      </p:stCondLst>
+                      <p:childTnLst>
+                        <p:par>
+                          <p:cTn id="22" fill="hold">
+                            <p:stCondLst>
+                              <p:cond delay="0"/>
+                            </p:stCondLst>
+                            <p:childTnLst>
+                              <p:par>
+                                <p:cTn id="23" presetID="1" presetClass="entr" presetSubtype="0" fill="hold" nodeType="clickEffect">
+                                  <p:stCondLst>
+                                    <p:cond delay="0"/>
+                                  </p:stCondLst>
+                                  <p:childTnLst>
+                                    <p:set>
+                                      <p:cBhvr>
+                                        <p:cTn id="24" dur="1" fill="hold">
+                                          <p:stCondLst>
+                                            <p:cond delay="0"/>
+                                          </p:stCondLst>
+                                        </p:cTn>
+                                        <p:tgtEl>
                                           <p:spTgt spid="67"/>
+                                        </p:tgtEl>
+                                        <p:attrNameLst>
+                                          <p:attrName>style.visibility</p:attrName>
+                                        </p:attrNameLst>
+                                      </p:cBhvr>
+                                      <p:to>
+                                        <p:strVal val="visible"/>
+                                      </p:to>
+                                    </p:set>
+                                  </p:childTnLst>
+                                </p:cTn>
+                              </p:par>
+                              <p:par>
+                                <p:cTn id="25" presetID="1" presetClass="entr" presetSubtype="0" fill="hold" nodeType="withEffect">
+                                  <p:stCondLst>
+                                    <p:cond delay="0"/>
+                                  </p:stCondLst>
+                                  <p:childTnLst>
+                                    <p:set>
+                                      <p:cBhvr>
+                                        <p:cTn id="26" dur="1" fill="hold">
+                                          <p:stCondLst>
+                                            <p:cond delay="0"/>
+                                          </p:stCondLst>
+                                        </p:cTn>
+                                        <p:tgtEl>
+                                          <p:spTgt spid="68"/>
+                                        </p:tgtEl>
+                                        <p:attrNameLst>
+                                          <p:attrName>style.visibility</p:attrName>
+                                        </p:attrNameLst>
+                                      </p:cBhvr>
+                                      <p:to>
+                                        <p:strVal val="visible"/>
+                                      </p:to>
+                                    </p:set>
+                                  </p:childTnLst>
+                                </p:cTn>
+                              </p:par>
+                              <p:par>
+                                <p:cTn id="27" presetID="1" presetClass="entr" presetSubtype="0" fill="hold" grpId="0" nodeType="withEffect">
+                                  <p:stCondLst>
+                                    <p:cond delay="0"/>
+                                  </p:stCondLst>
+                                  <p:childTnLst>
+                                    <p:set>
+                                      <p:cBhvr>
+                                        <p:cTn id="28" dur="1" fill="hold">
+                                          <p:stCondLst>
+                                            <p:cond delay="0"/>
+                                          </p:stCondLst>
+                                        </p:cTn>
+                                        <p:tgtEl>
+                                          <p:spTgt spid="70"/>
+                                        </p:tgtEl>
+                                        <p:attrNameLst>
+                                          <p:attrName>style.visibility</p:attrName>
+                                        </p:attrNameLst>
+                                      </p:cBhvr>
+                                      <p:to>
+                                        <p:strVal val="visible"/>
+                                      </p:to>
+                                    </p:set>
+                                  </p:childTnLst>
+                                </p:cTn>
+                              </p:par>
+                            </p:childTnLst>
+                          </p:cTn>
+                        </p:par>
+                      </p:childTnLst>
+                    </p:cTn>
+                  </p:par>
+                  <p:par>
+                    <p:cTn id="29" fill="hold">
+                      <p:stCondLst>
+                        <p:cond delay="indefinite"/>
+                      </p:stCondLst>
+                      <p:childTnLst>
+                        <p:par>
+                          <p:cTn id="30" fill="hold">
+                            <p:stCondLst>
+                              <p:cond delay="0"/>
+                            </p:stCondLst>
+                            <p:childTnLst>
+                              <p:par>
+                                <p:cTn id="31" presetID="1" presetClass="entr" presetSubtype="0" fill="hold" nodeType="clickEffect">
+                                  <p:stCondLst>
+                                    <p:cond delay="0"/>
+                                  </p:stCondLst>
+                                  <p:childTnLst>
+                                    <p:set>
+                                      <p:cBhvr>
+                                        <p:cTn id="32" dur="1" fill="hold">
+                                          <p:stCondLst>
+                                            <p:cond delay="0"/>
+                                          </p:stCondLst>
+                                        </p:cTn>
+                                        <p:tgtEl>
+                                          <p:spTgt spid="27"/>
+                                        </p:tgtEl>
+                                        <p:attrNameLst>
+                                          <p:attrName>style.visibility</p:attrName>
+                                        </p:attrNameLst>
+                                      </p:cBhvr>
+                                      <p:to>
+                                        <p:strVal val="visible"/>
+                                      </p:to>
+                                    </p:set>
+                                  </p:childTnLst>
+                                </p:cTn>
+                              </p:par>
+                              <p:par>
+                                <p:cTn id="33" presetID="1" presetClass="entr" presetSubtype="0" fill="hold" nodeType="withEffect">
+                                  <p:stCondLst>
+                                    <p:cond delay="0"/>
+                                  </p:stCondLst>
+                                  <p:childTnLst>
+                                    <p:set>
+                                      <p:cBhvr>
+                                        <p:cTn id="34" dur="1" fill="hold">
+                                          <p:stCondLst>
+                                            <p:cond delay="0"/>
+                                          </p:stCondLst>
+                                        </p:cTn>
+                                        <p:tgtEl>
+                                          <p:spTgt spid="10"/>
+                                        </p:tgtEl>
+                                        <p:attrNameLst>
+                                          <p:attrName>style.visibility</p:attrName>
+                                        </p:attrNameLst>
+                                      </p:cBhvr>
+                                      <p:to>
+                                        <p:strVal val="visible"/>
+                                      </p:to>
+                                    </p:set>
+                                  </p:childTnLst>
+                                </p:cTn>
+                              </p:par>
+                              <p:par>
+                                <p:cTn id="35" presetID="1" presetClass="entr" presetSubtype="0" fill="hold" nodeType="withEffect">
+                                  <p:stCondLst>
+                                    <p:cond delay="0"/>
+                                  </p:stCondLst>
+                                  <p:childTnLst>
+                                    <p:set>
+                                      <p:cBhvr>
+                                        <p:cTn id="36" dur="1" fill="hold">
+                                          <p:stCondLst>
+                                            <p:cond delay="0"/>
+                                          </p:stCondLst>
+                                        </p:cTn>
+                                        <p:tgtEl>
+                                          <p:spTgt spid="1030"/>
+                                        </p:tgtEl>
+                                        <p:attrNameLst>
+                                          <p:attrName>style.visibility</p:attrName>
+                                        </p:attrNameLst>
+                                      </p:cBhvr>
+                                      <p:to>
+                                        <p:strVal val="visible"/>
+                                      </p:to>
+                                    </p:set>
+                                  </p:childTnLst>
+                                </p:cTn>
+                              </p:par>
+                              <p:par>
+                                <p:cTn id="37" presetID="1" presetClass="entr" presetSubtype="0" fill="hold" grpId="0" nodeType="withEffect">
+                                  <p:stCondLst>
+                                    <p:cond delay="0"/>
+                                  </p:stCondLst>
+                                  <p:childTnLst>
+                                    <p:set>
+                                      <p:cBhvr>
+                                        <p:cTn id="38" dur="1" fill="hold">
+                                          <p:stCondLst>
+                                            <p:cond delay="0"/>
+                                          </p:stCondLst>
+                                        </p:cTn>
+                                        <p:tgtEl>
+                                          <p:spTgt spid="26"/>
                                         </p:tgtEl>
                                         <p:attrNameLst>
                                           <p:attrName>style.visibility</p:attrName>
@@ -6587,7 +6899,9 @@
       </p:par>
     </p:tnLst>
     <p:bldLst>
-      <p:bldP spid="58" grpId="0"/>
+      <p:bldP spid="26" grpId="0"/>
+      <p:bldP spid="70" grpId="0"/>
+      <p:bldP spid="71" grpId="0"/>
     </p:bldLst>
   </p:timing>
 </p:sld>
@@ -6775,6 +7089,13 @@
   <p:clrMapOvr>
     <a:masterClrMapping/>
   </p:clrMapOvr>
+  <p:timing>
+    <p:tnLst>
+      <p:par>
+        <p:cTn id="1" dur="indefinite" restart="never" nodeType="tmRoot"/>
+      </p:par>
+    </p:tnLst>
+  </p:timing>
 </p:sld>
 </file>
 

</xml_diff>

<commit_message>
Tatsächlich finale Version der Geschäftsidee
</commit_message>
<xml_diff>
--- a/Studium MW/Projektmanagement/Idee.pptx
+++ b/Studium MW/Projektmanagement/Idee.pptx
@@ -4175,7 +4175,7 @@
         </p:nvSpPr>
         <p:spPr>
           <a:xfrm>
-            <a:off x="1432560" y="1236736"/>
+            <a:off x="1432560" y="1740792"/>
             <a:ext cx="7406640" cy="1472184"/>
           </a:xfrm>
         </p:spPr>
@@ -4354,8 +4354,8 @@
         </p:blipFill>
         <p:spPr bwMode="auto">
           <a:xfrm>
-            <a:off x="4355976" y="1086313"/>
-            <a:ext cx="3352453" cy="2669151"/>
+            <a:off x="4856455" y="1268760"/>
+            <a:ext cx="2851974" cy="2270680"/>
           </a:xfrm>
           <a:prstGeom prst="rect">
             <a:avLst/>

</xml_diff>

<commit_message>
PV verschoben, Mitschriften BioTools neu
</commit_message>
<xml_diff>
--- a/Studium MW/Projektmanagement/Idee.pptx
+++ b/Studium MW/Projektmanagement/Idee.pptx
@@ -111,7 +111,7 @@
   </p:defaultTextStyle>
   <p:extLst>
     <p:ext uri="{EFAFB233-063F-42B5-8137-9DF3F51BA10A}">
-      <p15:sldGuideLst xmlns="" xmlns:p15="http://schemas.microsoft.com/office/powerpoint/2012/main">
+      <p15:sldGuideLst xmlns:p15="http://schemas.microsoft.com/office/powerpoint/2012/main" xmlns="">
         <p15:guide id="1" orient="horz" pos="2160">
           <p15:clr>
             <a:srgbClr val="A4A3A4"/>
@@ -262,7 +262,7 @@
           <a:p>
             <a:fld id="{711FCEC3-2D29-4418-8A7E-B6AD9CCC15C9}" type="datetimeFigureOut">
               <a:rPr lang="de-DE" smtClean="0"/>
-              <a:t>20.10.2017</a:t>
+              <a:t>28.10.2017</a:t>
             </a:fld>
             <a:endParaRPr lang="de-DE"/>
           </a:p>
@@ -575,7 +575,7 @@
           <a:p>
             <a:fld id="{711FCEC3-2D29-4418-8A7E-B6AD9CCC15C9}" type="datetimeFigureOut">
               <a:rPr lang="de-DE" smtClean="0"/>
-              <a:t>20.10.2017</a:t>
+              <a:t>28.10.2017</a:t>
             </a:fld>
             <a:endParaRPr lang="de-DE"/>
           </a:p>
@@ -760,7 +760,7 @@
           <a:p>
             <a:fld id="{711FCEC3-2D29-4418-8A7E-B6AD9CCC15C9}" type="datetimeFigureOut">
               <a:rPr lang="de-DE" smtClean="0"/>
-              <a:t>20.10.2017</a:t>
+              <a:t>28.10.2017</a:t>
             </a:fld>
             <a:endParaRPr lang="de-DE"/>
           </a:p>
@@ -935,7 +935,7 @@
           <a:p>
             <a:fld id="{711FCEC3-2D29-4418-8A7E-B6AD9CCC15C9}" type="datetimeFigureOut">
               <a:rPr lang="de-DE" smtClean="0"/>
-              <a:t>20.10.2017</a:t>
+              <a:t>28.10.2017</a:t>
             </a:fld>
             <a:endParaRPr lang="de-DE"/>
           </a:p>
@@ -1203,7 +1203,7 @@
           <a:p>
             <a:fld id="{711FCEC3-2D29-4418-8A7E-B6AD9CCC15C9}" type="datetimeFigureOut">
               <a:rPr lang="de-DE" smtClean="0"/>
-              <a:t>20.10.2017</a:t>
+              <a:t>28.10.2017</a:t>
             </a:fld>
             <a:endParaRPr lang="de-DE"/>
           </a:p>
@@ -1671,7 +1671,7 @@
           <a:p>
             <a:fld id="{711FCEC3-2D29-4418-8A7E-B6AD9CCC15C9}" type="datetimeFigureOut">
               <a:rPr lang="de-DE" smtClean="0"/>
-              <a:t>20.10.2017</a:t>
+              <a:t>28.10.2017</a:t>
             </a:fld>
             <a:endParaRPr lang="de-DE"/>
           </a:p>
@@ -2160,7 +2160,7 @@
           <a:p>
             <a:fld id="{711FCEC3-2D29-4418-8A7E-B6AD9CCC15C9}" type="datetimeFigureOut">
               <a:rPr lang="de-DE" smtClean="0"/>
-              <a:t>20.10.2017</a:t>
+              <a:t>28.10.2017</a:t>
             </a:fld>
             <a:endParaRPr lang="de-DE"/>
           </a:p>
@@ -2286,7 +2286,7 @@
           <a:p>
             <a:fld id="{711FCEC3-2D29-4418-8A7E-B6AD9CCC15C9}" type="datetimeFigureOut">
               <a:rPr lang="de-DE" smtClean="0"/>
-              <a:t>20.10.2017</a:t>
+              <a:t>28.10.2017</a:t>
             </a:fld>
             <a:endParaRPr lang="de-DE"/>
           </a:p>
@@ -2430,7 +2430,7 @@
           <a:p>
             <a:fld id="{711FCEC3-2D29-4418-8A7E-B6AD9CCC15C9}" type="datetimeFigureOut">
               <a:rPr lang="de-DE" smtClean="0"/>
-              <a:t>20.10.2017</a:t>
+              <a:t>28.10.2017</a:t>
             </a:fld>
             <a:endParaRPr lang="de-DE"/>
           </a:p>
@@ -2752,7 +2752,7 @@
           <a:p>
             <a:fld id="{711FCEC3-2D29-4418-8A7E-B6AD9CCC15C9}" type="datetimeFigureOut">
               <a:rPr lang="de-DE" smtClean="0"/>
-              <a:t>20.10.2017</a:t>
+              <a:t>28.10.2017</a:t>
             </a:fld>
             <a:endParaRPr lang="de-DE"/>
           </a:p>
@@ -2886,7 +2886,7 @@
           <a:p>
             <a:fld id="{711FCEC3-2D29-4418-8A7E-B6AD9CCC15C9}" type="datetimeFigureOut">
               <a:rPr lang="de-DE" smtClean="0"/>
-              <a:t>20.10.2017</a:t>
+              <a:t>28.10.2017</a:t>
             </a:fld>
             <a:endParaRPr lang="de-DE"/>
           </a:p>
@@ -3667,7 +3667,7 @@
           <a:p>
             <a:fld id="{711FCEC3-2D29-4418-8A7E-B6AD9CCC15C9}" type="datetimeFigureOut">
               <a:rPr lang="de-DE" smtClean="0"/>
-              <a:t>20.10.2017</a:t>
+              <a:t>28.10.2017</a:t>
             </a:fld>
             <a:endParaRPr lang="de-DE"/>
           </a:p>
@@ -7164,8 +7164,27 @@
           </a:p>
           <a:p>
             <a:r>
+              <a:rPr lang="de-DE" dirty="0" smtClean="0">
+                <a:hlinkClick r:id="rId3"/>
+              </a:rPr>
+              <a:t>http://</a:t>
+            </a:r>
+            <a:r>
+              <a:rPr lang="de-DE" dirty="0" smtClean="0">
+                <a:hlinkClick r:id="rId3"/>
+              </a:rPr>
+              <a:t>de.freepik.com/freie-ikonen/nachricht-auf-einem-zettel_738969.htm</a:t>
+            </a:r>
+            <a:endParaRPr lang="de-DE" dirty="0" smtClean="0"/>
+          </a:p>
+          <a:p>
+            <a:r>
               <a:rPr lang="de-DE" dirty="0" smtClean="0"/>
-              <a:t>http://de.freepik.com/freie-ikonen/nachricht-auf-einem-zettel_738969.htm</a:t>
+              <a:t>… (absolut unvollständig, hat zum Glück </a:t>
+            </a:r>
+            <a:r>
+              <a:rPr lang="de-DE" smtClean="0"/>
+              <a:t>keiner gemerkt)</a:t>
             </a:r>
             <a:endParaRPr lang="de-DE" dirty="0"/>
           </a:p>

</xml_diff>